<commit_message>
Day 5 Morning Session
Day 5 Morning Session ppt and examples
</commit_message>
<xml_diff>
--- a/Day2_morning/Generics.pptx
+++ b/Day2_morning/Generics.pptx
@@ -107,6 +107,22 @@
       </a:defRPr>
     </a:lvl9pPr>
   </p:defaultTextStyle>
+  <p:extLst>
+    <p:ext uri="{EFAFB233-063F-42B5-8137-9DF3F51BA10A}">
+      <p15:sldGuideLst xmlns:p15="http://schemas.microsoft.com/office/powerpoint/2012/main">
+        <p15:guide id="1" orient="horz" pos="2160">
+          <p15:clr>
+            <a:srgbClr val="A4A3A4"/>
+          </p15:clr>
+        </p15:guide>
+        <p15:guide id="2" pos="2880">
+          <p15:clr>
+            <a:srgbClr val="A4A3A4"/>
+          </p15:clr>
+        </p15:guide>
+      </p15:sldGuideLst>
+    </p:ext>
+  </p:extLst>
 </p:presentation>
 </file>
 
@@ -291,7 +307,7 @@
           <a:p>
             <a:fld id="{11A9D9BE-A9D2-4DFD-AD79-95A20346FE8A}" type="datetimeFigureOut">
               <a:rPr lang="en-US" smtClean="0"/>
-              <a:t>10/8/2015</a:t>
+              <a:t>10/11/2015</a:t>
             </a:fld>
             <a:endParaRPr lang="en-US"/>
           </a:p>
@@ -461,7 +477,7 @@
           <a:p>
             <a:fld id="{11A9D9BE-A9D2-4DFD-AD79-95A20346FE8A}" type="datetimeFigureOut">
               <a:rPr lang="en-US" smtClean="0"/>
-              <a:t>10/8/2015</a:t>
+              <a:t>10/11/2015</a:t>
             </a:fld>
             <a:endParaRPr lang="en-US"/>
           </a:p>
@@ -641,7 +657,7 @@
           <a:p>
             <a:fld id="{11A9D9BE-A9D2-4DFD-AD79-95A20346FE8A}" type="datetimeFigureOut">
               <a:rPr lang="en-US" smtClean="0"/>
-              <a:t>10/8/2015</a:t>
+              <a:t>10/11/2015</a:t>
             </a:fld>
             <a:endParaRPr lang="en-US"/>
           </a:p>
@@ -811,7 +827,7 @@
           <a:p>
             <a:fld id="{11A9D9BE-A9D2-4DFD-AD79-95A20346FE8A}" type="datetimeFigureOut">
               <a:rPr lang="en-US" smtClean="0"/>
-              <a:t>10/8/2015</a:t>
+              <a:t>10/11/2015</a:t>
             </a:fld>
             <a:endParaRPr lang="en-US"/>
           </a:p>
@@ -1057,7 +1073,7 @@
           <a:p>
             <a:fld id="{11A9D9BE-A9D2-4DFD-AD79-95A20346FE8A}" type="datetimeFigureOut">
               <a:rPr lang="en-US" smtClean="0"/>
-              <a:t>10/8/2015</a:t>
+              <a:t>10/11/2015</a:t>
             </a:fld>
             <a:endParaRPr lang="en-US"/>
           </a:p>
@@ -1345,7 +1361,7 @@
           <a:p>
             <a:fld id="{11A9D9BE-A9D2-4DFD-AD79-95A20346FE8A}" type="datetimeFigureOut">
               <a:rPr lang="en-US" smtClean="0"/>
-              <a:t>10/8/2015</a:t>
+              <a:t>10/11/2015</a:t>
             </a:fld>
             <a:endParaRPr lang="en-US"/>
           </a:p>
@@ -1767,7 +1783,7 @@
           <a:p>
             <a:fld id="{11A9D9BE-A9D2-4DFD-AD79-95A20346FE8A}" type="datetimeFigureOut">
               <a:rPr lang="en-US" smtClean="0"/>
-              <a:t>10/8/2015</a:t>
+              <a:t>10/11/2015</a:t>
             </a:fld>
             <a:endParaRPr lang="en-US"/>
           </a:p>
@@ -1885,7 +1901,7 @@
           <a:p>
             <a:fld id="{11A9D9BE-A9D2-4DFD-AD79-95A20346FE8A}" type="datetimeFigureOut">
               <a:rPr lang="en-US" smtClean="0"/>
-              <a:t>10/8/2015</a:t>
+              <a:t>10/11/2015</a:t>
             </a:fld>
             <a:endParaRPr lang="en-US"/>
           </a:p>
@@ -1980,7 +1996,7 @@
           <a:p>
             <a:fld id="{11A9D9BE-A9D2-4DFD-AD79-95A20346FE8A}" type="datetimeFigureOut">
               <a:rPr lang="en-US" smtClean="0"/>
-              <a:t>10/8/2015</a:t>
+              <a:t>10/11/2015</a:t>
             </a:fld>
             <a:endParaRPr lang="en-US"/>
           </a:p>
@@ -2257,7 +2273,7 @@
           <a:p>
             <a:fld id="{11A9D9BE-A9D2-4DFD-AD79-95A20346FE8A}" type="datetimeFigureOut">
               <a:rPr lang="en-US" smtClean="0"/>
-              <a:t>10/8/2015</a:t>
+              <a:t>10/11/2015</a:t>
             </a:fld>
             <a:endParaRPr lang="en-US"/>
           </a:p>
@@ -2510,7 +2526,7 @@
           <a:p>
             <a:fld id="{11A9D9BE-A9D2-4DFD-AD79-95A20346FE8A}" type="datetimeFigureOut">
               <a:rPr lang="en-US" smtClean="0"/>
-              <a:t>10/8/2015</a:t>
+              <a:t>10/11/2015</a:t>
             </a:fld>
             <a:endParaRPr lang="en-US"/>
           </a:p>
@@ -2723,7 +2739,7 @@
           <a:p>
             <a:fld id="{11A9D9BE-A9D2-4DFD-AD79-95A20346FE8A}" type="datetimeFigureOut">
               <a:rPr lang="en-US" smtClean="0"/>
-              <a:t>10/8/2015</a:t>
+              <a:t>10/11/2015</a:t>
             </a:fld>
             <a:endParaRPr lang="en-US"/>
           </a:p>
@@ -4443,11 +4459,7 @@
           <a:p>
             <a:r>
               <a:rPr lang="en-US" sz="1400" dirty="0" smtClean="0"/>
-              <a:t>Create </a:t>
-            </a:r>
-            <a:r>
-              <a:rPr lang="en-US" sz="1400" dirty="0" smtClean="0"/>
-              <a:t>a simple Linked list (</a:t>
+              <a:t>Create a simple Linked list (</a:t>
             </a:r>
             <a:r>
               <a:rPr lang="en-US" sz="1400" dirty="0" err="1" smtClean="0"/>
@@ -4606,7 +4618,7 @@
           <p:nvPr>
             <p:extLst>
               <p:ext uri="{D42A27DB-BD31-4B8C-83A1-F6EECF244321}">
-                <p14:modId xmlns:p14="http://schemas.microsoft.com/office/powerpoint/2010/main" val="2797327688"/>
+                <p14:modId xmlns:p14="http://schemas.microsoft.com/office/powerpoint/2010/main" val="4020975883"/>
               </p:ext>
             </p:extLst>
           </p:nvPr>
@@ -4619,7 +4631,7 @@
           <a:graphicData uri="http://schemas.openxmlformats.org/presentationml/2006/ole">
             <mc:AlternateContent xmlns:mc="http://schemas.openxmlformats.org/markup-compatibility/2006">
               <mc:Choice xmlns:v="urn:schemas-microsoft-com:vml" Requires="v">
-                <p:oleObj spid="_x0000_s1032" name="Packager Shell Object" showAsIcon="1" r:id="rId3" imgW="825840" imgH="685800" progId="Package">
+                <p:oleObj spid="_x0000_s1033" name="Packager Shell Object" showAsIcon="1" r:id="rId3" imgW="825840" imgH="685800" progId="Package">
                   <p:embed/>
                 </p:oleObj>
               </mc:Choice>

</xml_diff>